<commit_message>
fix issue about 'Configuration of workspaces using system properties'
</commit_message>
<xml_diff>
--- a/JPP6-JCR/Day-4.pptx
+++ b/JPP6-JCR/Day-4.pptx
@@ -12336,15 +12336,47 @@
               <a:t>If we have a system property called </a:t>
             </a:r>
             <a:r>
+              <a:rPr lang="en-US" sz="1400" b="1" dirty="0" smtClean="0">
+                <a:latin typeface="Monaco"/>
+                <a:cs typeface="Monaco"/>
+              </a:rPr>
+              <a:t>exo.jcr.config.force.workspace.repository_collaboration.container.foo </a:t>
+            </a:r>
+            <a:r>
+              <a:rPr lang="en-US" sz="1400" b="1" dirty="0"/>
+              <a:t>that has been defined, its value will be used for the configuration of the repository 'repository' and the workspace 'collaboration'</a:t>
+            </a:r>
+          </a:p>
+          <a:p>
+            <a:pPr marL="342900" indent="-342900">
+              <a:lnSpc>
+                <a:spcPct val="100000"/>
+              </a:lnSpc>
+              <a:buSzPct val="100000"/>
+              <a:buFont typeface="+mj-lt"/>
+              <a:buAutoNum type="arabicPeriod"/>
+            </a:pPr>
+            <a:r>
+              <a:rPr lang="en-US" sz="1400" b="1" dirty="0"/>
+              <a:t>If we have a system property called</a:t>
+            </a:r>
+            <a:r>
               <a:rPr lang="en-US" sz="1400" b="1" dirty="0">
                 <a:latin typeface="Monaco"/>
                 <a:cs typeface="Monaco"/>
               </a:rPr>
-              <a:t>exo.jcr.config.force.workspace.repository-collaboration.container.foo </a:t>
+              <a:t> </a:t>
+            </a:r>
+            <a:r>
+              <a:rPr lang="en-US" sz="1400" b="1" dirty="0" err="1">
+                <a:latin typeface="Monaco"/>
+                <a:cs typeface="Monaco"/>
+              </a:rPr>
+              <a:t>exo.jcr.config.force.repository.repository.container.foo</a:t>
             </a:r>
             <a:r>
               <a:rPr lang="en-US" sz="1400" b="1" dirty="0"/>
-              <a:t>that has been defined, its value will be used for the configuration of the repository 'repository' and the workspace 'collaboration'</a:t>
+              <a:t> that has been defined, its value will be used for the configuration of all the workspaces of the repository 'repository' except the workspaces for which we configured the same property using system properties defined in #1</a:t>
             </a:r>
           </a:p>
           <a:p>
@@ -12358,25 +12390,25 @@
             </a:pPr>
             <a:r>
               <a:rPr lang="en-US" sz="1400" b="1" dirty="0"/>
-              <a:t>If we have a system property called</a:t>
+              <a:t>If we have a system property called </a:t>
+            </a:r>
+            <a:r>
+              <a:rPr lang="en-US" sz="1400" b="1" dirty="0" err="1">
+                <a:latin typeface="Monaco"/>
+                <a:cs typeface="Monaco"/>
+              </a:rPr>
+              <a:t>exo.jcr.config.force.all.container.foo</a:t>
             </a:r>
             <a:r>
               <a:rPr lang="en-US" sz="1400" b="1" dirty="0">
                 <a:latin typeface="Monaco"/>
                 <a:cs typeface="Monaco"/>
               </a:rPr>
-              <a:t> </a:t>
-            </a:r>
-            <a:r>
-              <a:rPr lang="en-US" sz="1400" b="1" dirty="0" err="1">
-                <a:latin typeface="Monaco"/>
-                <a:cs typeface="Monaco"/>
-              </a:rPr>
-              <a:t>exo.jcr.config.force.repository.repository.container.foo</a:t>
+              <a:t> th</a:t>
             </a:r>
             <a:r>
               <a:rPr lang="en-US" sz="1400" b="1" dirty="0"/>
-              <a:t> that has been defined, its value will be used for the configuration of all the workspaces of the repository 'repository' except the workspaces for which we configured the same property using system properties defined in #1</a:t>
+              <a:t>at has been defined, its value will be used for the configuration of all the workspaces except the workspaces for which we configured the same property using system properties defined in #1 or #2</a:t>
             </a:r>
           </a:p>
           <a:p>
@@ -12390,68 +12422,43 @@
             </a:pPr>
             <a:r>
               <a:rPr lang="en-US" sz="1400" b="1" dirty="0"/>
-              <a:t>If we have a system property called </a:t>
-            </a:r>
-            <a:r>
-              <a:rPr lang="en-US" sz="1400" b="1" dirty="0" err="1">
+              <a:t>If we have a property 'foo' configured for the repository 'repository' and the workspace 'collaboration' and we have no system properties corresponding to </a:t>
+            </a:r>
+            <a:r>
+              <a:rPr lang="en-US" sz="1400" b="1" dirty="0" smtClean="0"/>
+              <a:t>rules </a:t>
+            </a:r>
+            <a:r>
+              <a:rPr lang="en-US" sz="1400" b="1" dirty="0"/>
+              <a:t>#1, #2 and #3, we will use this value (current behavior)</a:t>
+            </a:r>
+          </a:p>
+          <a:p>
+            <a:pPr marL="342900" indent="-342900">
+              <a:lnSpc>
+                <a:spcPct val="100000"/>
+              </a:lnSpc>
+              <a:buSzPct val="100000"/>
+              <a:buFont typeface="+mj-lt"/>
+              <a:buAutoNum type="arabicPeriod"/>
+            </a:pPr>
+            <a:r>
+              <a:rPr lang="en-US" sz="1400" b="1" dirty="0"/>
+              <a:t>If the previous rules don't allow to give a value to the property 'foo', we will then check the default value in the following order </a:t>
+            </a:r>
+            <a:r>
+              <a:rPr lang="en-US" sz="1400" b="1" dirty="0" smtClean="0">
                 <a:latin typeface="Monaco"/>
                 <a:cs typeface="Monaco"/>
               </a:rPr>
-              <a:t>exo.jcr.config.force.all.container.foo</a:t>
+              <a:t>exo.jcr.config.default.workspace.repository_collaboration.container.foo</a:t>
             </a:r>
             <a:r>
               <a:rPr lang="en-US" sz="1400" b="1" dirty="0">
                 <a:latin typeface="Monaco"/>
                 <a:cs typeface="Monaco"/>
               </a:rPr>
-              <a:t> th</a:t>
-            </a:r>
-            <a:r>
-              <a:rPr lang="en-US" sz="1400" b="1" dirty="0"/>
-              <a:t>at has been defined, its value will be used for the configuration of all the workspaces except the workspaces for which we configured the same property using system properties defined in #1 or #2</a:t>
-            </a:r>
-          </a:p>
-          <a:p>
-            <a:pPr marL="342900" indent="-342900">
-              <a:lnSpc>
-                <a:spcPct val="100000"/>
-              </a:lnSpc>
-              <a:buSzPct val="100000"/>
-              <a:buFont typeface="+mj-lt"/>
-              <a:buAutoNum type="arabicPeriod"/>
-            </a:pPr>
-            <a:r>
-              <a:rPr lang="en-US" sz="1400" b="1" dirty="0"/>
-              <a:t>If we have a property 'foo' configured for the repository 'repository' and the workspace 'collaboration' and we have no system properties corresponding to </a:t>
-            </a:r>
-            <a:r>
-              <a:rPr lang="en-US" sz="1400" b="1" dirty="0" smtClean="0"/>
-              <a:t>rules </a:t>
-            </a:r>
-            <a:r>
-              <a:rPr lang="en-US" sz="1400" b="1" dirty="0"/>
-              <a:t>#1, #2 and #3, we will use this value (current behavior)</a:t>
-            </a:r>
-          </a:p>
-          <a:p>
-            <a:pPr marL="342900" indent="-342900">
-              <a:lnSpc>
-                <a:spcPct val="100000"/>
-              </a:lnSpc>
-              <a:buSzPct val="100000"/>
-              <a:buFont typeface="+mj-lt"/>
-              <a:buAutoNum type="arabicPeriod"/>
-            </a:pPr>
-            <a:r>
-              <a:rPr lang="en-US" sz="1400" b="1" dirty="0"/>
-              <a:t>If the previous rules don't allow to give a value to the property 'foo', we will then check the default value in the following order </a:t>
-            </a:r>
-            <a:r>
-              <a:rPr lang="en-US" sz="1400" b="1" dirty="0">
-                <a:latin typeface="Monaco"/>
-                <a:cs typeface="Monaco"/>
-              </a:rPr>
-              <a:t>exo.jcr.config.default.workspace.repository-collaboration.container.foo, </a:t>
+              <a:t>, </a:t>
             </a:r>
             <a:r>
               <a:rPr lang="en-US" sz="1400" b="1" dirty="0" err="1">

</xml_diff>